<commit_message>
acl 3.1.1 version release
</commit_message>
<xml_diff>
--- a/doc/redis.pptx
+++ b/doc/redis.pptx
@@ -290,7 +290,7 @@
             <a:fld id="{530820CF-B880-4189-942D-D702A7CBA730}" type="datetimeFigureOut">
               <a:rPr lang="zh-CN" altLang="en-US" smtClean="0"/>
               <a:pPr/>
-              <a:t>2015/3/24</a:t>
+              <a:t>2015/3/29</a:t>
             </a:fld>
             <a:endParaRPr lang="zh-CN" altLang="en-US"/>
           </a:p>
@@ -457,7 +457,7 @@
             <a:fld id="{530820CF-B880-4189-942D-D702A7CBA730}" type="datetimeFigureOut">
               <a:rPr lang="zh-CN" altLang="en-US" smtClean="0"/>
               <a:pPr/>
-              <a:t>2015/3/24</a:t>
+              <a:t>2015/3/29</a:t>
             </a:fld>
             <a:endParaRPr lang="zh-CN" altLang="en-US"/>
           </a:p>
@@ -634,7 +634,7 @@
             <a:fld id="{530820CF-B880-4189-942D-D702A7CBA730}" type="datetimeFigureOut">
               <a:rPr lang="zh-CN" altLang="en-US" smtClean="0"/>
               <a:pPr/>
-              <a:t>2015/3/24</a:t>
+              <a:t>2015/3/29</a:t>
             </a:fld>
             <a:endParaRPr lang="zh-CN" altLang="en-US"/>
           </a:p>
@@ -801,7 +801,7 @@
             <a:fld id="{530820CF-B880-4189-942D-D702A7CBA730}" type="datetimeFigureOut">
               <a:rPr lang="zh-CN" altLang="en-US" smtClean="0"/>
               <a:pPr/>
-              <a:t>2015/3/24</a:t>
+              <a:t>2015/3/29</a:t>
             </a:fld>
             <a:endParaRPr lang="zh-CN" altLang="en-US"/>
           </a:p>
@@ -1044,7 +1044,7 @@
             <a:fld id="{530820CF-B880-4189-942D-D702A7CBA730}" type="datetimeFigureOut">
               <a:rPr lang="zh-CN" altLang="en-US" smtClean="0"/>
               <a:pPr/>
-              <a:t>2015/3/24</a:t>
+              <a:t>2015/3/29</a:t>
             </a:fld>
             <a:endParaRPr lang="zh-CN" altLang="en-US"/>
           </a:p>
@@ -1329,7 +1329,7 @@
             <a:fld id="{530820CF-B880-4189-942D-D702A7CBA730}" type="datetimeFigureOut">
               <a:rPr lang="zh-CN" altLang="en-US" smtClean="0"/>
               <a:pPr/>
-              <a:t>2015/3/24</a:t>
+              <a:t>2015/3/29</a:t>
             </a:fld>
             <a:endParaRPr lang="zh-CN" altLang="en-US"/>
           </a:p>
@@ -1748,7 +1748,7 @@
             <a:fld id="{530820CF-B880-4189-942D-D702A7CBA730}" type="datetimeFigureOut">
               <a:rPr lang="zh-CN" altLang="en-US" smtClean="0"/>
               <a:pPr/>
-              <a:t>2015/3/24</a:t>
+              <a:t>2015/3/29</a:t>
             </a:fld>
             <a:endParaRPr lang="zh-CN" altLang="en-US"/>
           </a:p>
@@ -1863,7 +1863,7 @@
             <a:fld id="{530820CF-B880-4189-942D-D702A7CBA730}" type="datetimeFigureOut">
               <a:rPr lang="zh-CN" altLang="en-US" smtClean="0"/>
               <a:pPr/>
-              <a:t>2015/3/24</a:t>
+              <a:t>2015/3/29</a:t>
             </a:fld>
             <a:endParaRPr lang="zh-CN" altLang="en-US"/>
           </a:p>
@@ -1955,7 +1955,7 @@
             <a:fld id="{530820CF-B880-4189-942D-D702A7CBA730}" type="datetimeFigureOut">
               <a:rPr lang="zh-CN" altLang="en-US" smtClean="0"/>
               <a:pPr/>
-              <a:t>2015/3/24</a:t>
+              <a:t>2015/3/29</a:t>
             </a:fld>
             <a:endParaRPr lang="zh-CN" altLang="en-US"/>
           </a:p>
@@ -2229,7 +2229,7 @@
             <a:fld id="{530820CF-B880-4189-942D-D702A7CBA730}" type="datetimeFigureOut">
               <a:rPr lang="zh-CN" altLang="en-US" smtClean="0"/>
               <a:pPr/>
-              <a:t>2015/3/24</a:t>
+              <a:t>2015/3/29</a:t>
             </a:fld>
             <a:endParaRPr lang="zh-CN" altLang="en-US"/>
           </a:p>
@@ -2479,7 +2479,7 @@
             <a:fld id="{530820CF-B880-4189-942D-D702A7CBA730}" type="datetimeFigureOut">
               <a:rPr lang="zh-CN" altLang="en-US" smtClean="0"/>
               <a:pPr/>
-              <a:t>2015/3/24</a:t>
+              <a:t>2015/3/29</a:t>
             </a:fld>
             <a:endParaRPr lang="zh-CN" altLang="en-US"/>
           </a:p>
@@ -2689,7 +2689,7 @@
             <a:fld id="{530820CF-B880-4189-942D-D702A7CBA730}" type="datetimeFigureOut">
               <a:rPr lang="zh-CN" altLang="en-US" smtClean="0"/>
               <a:pPr/>
-              <a:t>2015/3/24</a:t>
+              <a:t>2015/3/29</a:t>
             </a:fld>
             <a:endParaRPr lang="zh-CN" altLang="en-US"/>
           </a:p>
@@ -3288,7 +3288,19 @@
             </a:r>
             <a:r>
               <a:rPr lang="zh-CN" altLang="en-US" dirty="0" smtClean="0"/>
-              <a:t>个操作方法</a:t>
+              <a:t>个操作</a:t>
+            </a:r>
+            <a:r>
+              <a:rPr lang="zh-CN" altLang="en-US" dirty="0" smtClean="0"/>
+              <a:t>方法，</a:t>
+            </a:r>
+            <a:r>
+              <a:rPr lang="en-US" altLang="zh-CN" dirty="0" smtClean="0"/>
+              <a:t>7000+ </a:t>
+            </a:r>
+            <a:r>
+              <a:rPr lang="zh-CN" altLang="en-US" smtClean="0"/>
+              <a:t>行源码</a:t>
             </a:r>
             <a:endParaRPr lang="en-US" altLang="zh-CN" dirty="0" smtClean="0"/>
           </a:p>

</xml_diff>